<commit_message>
update presentation; add notebook for image eda
</commit_message>
<xml_diff>
--- a/present1.pptx
+++ b/present1.pptx
@@ -8,7 +8,8 @@
     <p:sldId id="256" r:id="rId2"/>
     <p:sldId id="257" r:id="rId3"/>
     <p:sldId id="258" r:id="rId4"/>
-    <p:sldId id="259" r:id="rId5"/>
+    <p:sldId id="260" r:id="rId5"/>
+    <p:sldId id="259" r:id="rId6"/>
   </p:sldIdLst>
   <p:sldSz cx="12192000" cy="6858000"/>
   <p:notesSz cx="6858000" cy="9144000"/>
@@ -107,6 +108,11 @@
       </a:defRPr>
     </a:lvl9pPr>
   </p:defaultTextStyle>
+  <p:extLst>
+    <p:ext uri="{EFAFB233-063F-42B5-8137-9DF3F51BA10A}">
+      <p15:sldGuideLst xmlns:p15="http://schemas.microsoft.com/office/powerpoint/2012/main"/>
+    </p:ext>
+  </p:extLst>
 </p:presentation>
 </file>
 
@@ -3542,10 +3548,136 @@
         </p:nvSpPr>
         <p:spPr/>
         <p:txBody>
-          <a:bodyPr/>
-          <a:lstStyle/>
-          <a:p>
-            <a:endParaRPr lang="en-GB"/>
+          <a:bodyPr>
+            <a:normAutofit lnSpcReduction="10000"/>
+          </a:bodyPr>
+          <a:lstStyle/>
+          <a:p>
+            <a:r>
+              <a:rPr lang="en-GB" sz="1600" dirty="0" err="1"/>
+              <a:t>SaRNet</a:t>
+            </a:r>
+            <a:r>
+              <a:rPr lang="en-GB" sz="1600" dirty="0"/>
+              <a:t>: A Dataset for Deep Learning Assisted Search and Rescue with Satellite Imagery - </a:t>
+            </a:r>
+            <a:r>
+              <a:rPr lang="en-GB" sz="1600" dirty="0">
+                <a:hlinkClick r:id="rId2"/>
+              </a:rPr>
+              <a:t>https://arxiv.org/abs/2107.12469</a:t>
+            </a:r>
+            <a:r>
+              <a:rPr lang="en-GB" sz="1600" dirty="0"/>
+              <a:t> </a:t>
+            </a:r>
+          </a:p>
+          <a:p>
+            <a:pPr lvl="1"/>
+            <a:r>
+              <a:rPr lang="en-GB" sz="1400" dirty="0"/>
+              <a:t>Exploring similar dataset and its usage</a:t>
+            </a:r>
+          </a:p>
+          <a:p>
+            <a:r>
+              <a:rPr lang="en-GB" sz="1600" dirty="0"/>
+              <a:t>Small Target Detection for Search and Rescue Operations using Distributed Deep Learning and Synthetic Data Generation - </a:t>
+            </a:r>
+            <a:r>
+              <a:rPr lang="en-GB" sz="1600" dirty="0">
+                <a:hlinkClick r:id="rId3"/>
+              </a:rPr>
+              <a:t>https://arxiv.org/pdf/1904.11619.pdf</a:t>
+            </a:r>
+            <a:r>
+              <a:rPr lang="en-GB" sz="1600" dirty="0"/>
+              <a:t> </a:t>
+            </a:r>
+          </a:p>
+          <a:p>
+            <a:pPr lvl="1"/>
+            <a:r>
+              <a:rPr lang="en-GB" sz="1400" dirty="0"/>
+              <a:t>“We combined image segmentation, enhancement, and convolution neural networks to reduce detection time to detect small targets. We compared the performance between the auto-detection system and the human eye. Our system detected the target within 8 seconds, but the human eye detected the target within 25 seconds. Our systems also used synthetic data generation and data augmentation techniques to improve target detection accuracy”</a:t>
+            </a:r>
+          </a:p>
+          <a:p>
+            <a:r>
+              <a:rPr lang="en-GB" sz="1600" dirty="0"/>
+              <a:t>Automatic Person Detection in Search and Rescue Operations Using Deep CNN Detectors - </a:t>
+            </a:r>
+            <a:r>
+              <a:rPr lang="en-GB" sz="1600" dirty="0">
+                <a:hlinkClick r:id="rId4"/>
+              </a:rPr>
+              <a:t>https://ieeexplore.ieee.org/document/9369386/algorithms</a:t>
+            </a:r>
+            <a:r>
+              <a:rPr lang="en-GB" sz="1600" dirty="0"/>
+              <a:t>  </a:t>
+            </a:r>
+          </a:p>
+          <a:p>
+            <a:pPr lvl="1"/>
+            <a:r>
+              <a:rPr lang="en-GB" sz="1400" dirty="0"/>
+              <a:t> In this paper, the reliability of existing state-of-the-art detectors such as Faster R-CNN, YOLOv4, </a:t>
+            </a:r>
+            <a:r>
+              <a:rPr lang="en-GB" sz="1400" dirty="0" err="1"/>
+              <a:t>RetinaNet</a:t>
+            </a:r>
+            <a:r>
+              <a:rPr lang="en-GB" sz="1400" dirty="0"/>
+              <a:t>, and Cascade R-CNN on a </a:t>
+            </a:r>
+            <a:r>
+              <a:rPr lang="en-GB" sz="1400" dirty="0" err="1"/>
+              <a:t>VisDrone</a:t>
+            </a:r>
+            <a:r>
+              <a:rPr lang="en-GB" sz="1400" dirty="0"/>
+              <a:t> benchmark and custom-made dataset SARD build to simulate rescue scenes was investigated. After training the models on selected datasets, detection results were compared. Because of the high speed and accuracy and the small number of false detections, the YOLOv4 detector was chosen for further examination. […] YOLOv4 has achieved the best detection performances </a:t>
+            </a:r>
+          </a:p>
+          <a:p>
+            <a:r>
+              <a:rPr lang="en-GB" sz="1700" b="1" dirty="0"/>
+              <a:t>Deep Reinforcement Learning for Autonomous Search and Rescue - </a:t>
+            </a:r>
+            <a:r>
+              <a:rPr lang="en-GB" sz="1700" b="1" dirty="0">
+                <a:hlinkClick r:id="rId5"/>
+              </a:rPr>
+              <a:t>https://ieeexplore.ieee.org/document/8556642</a:t>
+            </a:r>
+            <a:r>
+              <a:rPr lang="en-GB" sz="1700" b="1" dirty="0"/>
+              <a:t> </a:t>
+            </a:r>
+          </a:p>
+          <a:p>
+            <a:pPr lvl="1"/>
+            <a:r>
+              <a:rPr lang="en-GB" sz="1500" dirty="0"/>
+              <a:t>The prototype successfully demonstrated the feasibility of using an artificial intelligence to direct unmanned aerial vehicles to search. […] However, given the real-time, real-physics nature of a single simulated run, training time simply takes too long, inhibiting the success rate of the intelligent system</a:t>
+            </a:r>
+          </a:p>
+          <a:p>
+            <a:pPr lvl="1"/>
+            <a:endParaRPr lang="en-GB" b="1" dirty="0"/>
+          </a:p>
+          <a:p>
+            <a:endParaRPr lang="en-GB" sz="1800" dirty="0"/>
+          </a:p>
+          <a:p>
+            <a:pPr lvl="1"/>
+            <a:endParaRPr lang="en-GB" sz="1400" dirty="0"/>
+          </a:p>
+          <a:p>
+            <a:pPr lvl="1"/>
+            <a:endParaRPr lang="en-GB" sz="1400" dirty="0"/>
           </a:p>
         </p:txBody>
       </p:sp>
@@ -3584,6 +3716,130 @@
           <p:cNvPr id="2" name="Title 1">
             <a:extLst>
               <a:ext uri="{FF2B5EF4-FFF2-40B4-BE49-F238E27FC236}">
+                <a16:creationId xmlns:a16="http://schemas.microsoft.com/office/drawing/2014/main" id="{A0DD301A-450D-594E-96E3-EB9F39E7691F}"/>
+              </a:ext>
+            </a:extLst>
+          </p:cNvPr>
+          <p:cNvSpPr>
+            <a:spLocks noGrp="1"/>
+          </p:cNvSpPr>
+          <p:nvPr>
+            <p:ph type="title"/>
+          </p:nvPr>
+        </p:nvSpPr>
+        <p:spPr/>
+        <p:txBody>
+          <a:bodyPr/>
+          <a:lstStyle/>
+          <a:p>
+            <a:r>
+              <a:rPr lang="en-GB" dirty="0"/>
+              <a:t>Overview scientific papers</a:t>
+            </a:r>
+          </a:p>
+        </p:txBody>
+      </p:sp>
+      <p:sp>
+        <p:nvSpPr>
+          <p:cNvPr id="3" name="Content Placeholder 2">
+            <a:extLst>
+              <a:ext uri="{FF2B5EF4-FFF2-40B4-BE49-F238E27FC236}">
+                <a16:creationId xmlns:a16="http://schemas.microsoft.com/office/drawing/2014/main" id="{049DD2FC-FAFA-C94C-A960-34A207F06461}"/>
+              </a:ext>
+            </a:extLst>
+          </p:cNvPr>
+          <p:cNvSpPr>
+            <a:spLocks noGrp="1"/>
+          </p:cNvSpPr>
+          <p:nvPr>
+            <p:ph idx="1"/>
+          </p:nvPr>
+        </p:nvSpPr>
+        <p:spPr/>
+        <p:txBody>
+          <a:bodyPr>
+            <a:normAutofit/>
+          </a:bodyPr>
+          <a:lstStyle/>
+          <a:p>
+            <a:r>
+              <a:rPr lang="en-GB" sz="1600" dirty="0"/>
+              <a:t>Search and Rescue with Airborne Optical Sectioning - </a:t>
+            </a:r>
+            <a:r>
+              <a:rPr lang="en-GB" sz="1600" dirty="0">
+                <a:hlinkClick r:id="rId2"/>
+              </a:rPr>
+              <a:t>https://arxiv.org/abs/2009.08835</a:t>
+            </a:r>
+            <a:r>
+              <a:rPr lang="en-GB" sz="1600" dirty="0"/>
+              <a:t> </a:t>
+            </a:r>
+          </a:p>
+          <a:p>
+            <a:pPr lvl="1"/>
+            <a:r>
+              <a:rPr lang="en-GB" sz="1400" dirty="0"/>
+              <a:t>We show that automated person detection under occlusion conditions can be significantly improved by combining </a:t>
+            </a:r>
+            <a:r>
+              <a:rPr lang="en-GB" sz="1400" dirty="0" err="1"/>
+              <a:t>multiperspective</a:t>
+            </a:r>
+            <a:r>
+              <a:rPr lang="en-GB" sz="1400" dirty="0"/>
+              <a:t> images before classification. Here, we employed image integration by Airborne Optical Sectioning (AOS)—a synthetic aperture imaging technique that uses camera drones to capture unstructured thermal light fields—to achieve this with a precision/recall of 96/93%. Finding lost or injured people in dense forests is not generally feasible with thermal recordings, but becomes practical with use of AOS integral images.</a:t>
+            </a:r>
+          </a:p>
+          <a:p>
+            <a:endParaRPr lang="en-GB" sz="1800" dirty="0"/>
+          </a:p>
+          <a:p>
+            <a:pPr lvl="1"/>
+            <a:endParaRPr lang="en-GB" sz="1400" dirty="0"/>
+          </a:p>
+          <a:p>
+            <a:pPr lvl="1"/>
+            <a:endParaRPr lang="en-GB" sz="1400" dirty="0"/>
+          </a:p>
+        </p:txBody>
+      </p:sp>
+    </p:spTree>
+    <p:extLst>
+      <p:ext uri="{BB962C8B-B14F-4D97-AF65-F5344CB8AC3E}">
+        <p14:creationId xmlns:p14="http://schemas.microsoft.com/office/powerpoint/2010/main" val="2293688204"/>
+      </p:ext>
+    </p:extLst>
+  </p:cSld>
+  <p:clrMapOvr>
+    <a:masterClrMapping/>
+  </p:clrMapOvr>
+</p:sld>
+</file>
+
+<file path=ppt/slides/slide5.xml><?xml version="1.0" encoding="utf-8"?>
+<p:sld xmlns:a="http://schemas.openxmlformats.org/drawingml/2006/main" xmlns:r="http://schemas.openxmlformats.org/officeDocument/2006/relationships" xmlns:p="http://schemas.openxmlformats.org/presentationml/2006/main">
+  <p:cSld>
+    <p:spTree>
+      <p:nvGrpSpPr>
+        <p:cNvPr id="1" name=""/>
+        <p:cNvGrpSpPr/>
+        <p:nvPr/>
+      </p:nvGrpSpPr>
+      <p:grpSpPr>
+        <a:xfrm>
+          <a:off x="0" y="0"/>
+          <a:ext cx="0" cy="0"/>
+          <a:chOff x="0" y="0"/>
+          <a:chExt cx="0" cy="0"/>
+        </a:xfrm>
+      </p:grpSpPr>
+      <p:sp>
+        <p:nvSpPr>
+          <p:cNvPr id="2" name="Title 1">
+            <a:extLst>
+              <a:ext uri="{FF2B5EF4-FFF2-40B4-BE49-F238E27FC236}">
                 <a16:creationId xmlns:a16="http://schemas.microsoft.com/office/drawing/2014/main" id="{352E7183-CA7F-E647-B585-80382C600342}"/>
               </a:ext>
             </a:extLst>
@@ -3628,10 +3884,46 @@
           <a:bodyPr/>
           <a:lstStyle/>
           <a:p>
-            <a:endParaRPr lang="en-GB"/>
-          </a:p>
-        </p:txBody>
-      </p:sp>
+            <a:r>
+              <a:rPr lang="en-GB" dirty="0"/>
+              <a:t>Basic exploration</a:t>
+            </a:r>
+          </a:p>
+          <a:p>
+            <a:endParaRPr lang="en-GB" dirty="0"/>
+          </a:p>
+        </p:txBody>
+      </p:sp>
+      <p:pic>
+        <p:nvPicPr>
+          <p:cNvPr id="4" name="Picture 3">
+            <a:extLst>
+              <a:ext uri="{FF2B5EF4-FFF2-40B4-BE49-F238E27FC236}">
+                <a16:creationId xmlns:a16="http://schemas.microsoft.com/office/drawing/2014/main" id="{A3547670-8B23-4247-BC4A-9371B33B30DF}"/>
+              </a:ext>
+            </a:extLst>
+          </p:cNvPr>
+          <p:cNvPicPr>
+            <a:picLocks noChangeAspect="1"/>
+          </p:cNvPicPr>
+          <p:nvPr/>
+        </p:nvPicPr>
+        <p:blipFill>
+          <a:blip r:embed="rId2"/>
+          <a:stretch>
+            <a:fillRect/>
+          </a:stretch>
+        </p:blipFill>
+        <p:spPr>
+          <a:xfrm>
+            <a:off x="2540000" y="2468561"/>
+            <a:ext cx="6436078" cy="4201547"/>
+          </a:xfrm>
+          <a:prstGeom prst="rect">
+            <a:avLst/>
+          </a:prstGeom>
+        </p:spPr>
+      </p:pic>
     </p:spTree>
     <p:extLst>
       <p:ext uri="{BB962C8B-B14F-4D97-AF65-F5344CB8AC3E}">

</xml_diff>

<commit_message>
add python files from official repo and add markdown for literature file
</commit_message>
<xml_diff>
--- a/present1.pptx
+++ b/present1.pptx
@@ -9,7 +9,8 @@
     <p:sldId id="257" r:id="rId3"/>
     <p:sldId id="258" r:id="rId4"/>
     <p:sldId id="260" r:id="rId5"/>
-    <p:sldId id="259" r:id="rId6"/>
+    <p:sldId id="261" r:id="rId6"/>
+    <p:sldId id="259" r:id="rId7"/>
   </p:sldIdLst>
   <p:sldSz cx="12192000" cy="6858000"/>
   <p:notesSz cx="6858000" cy="9144000"/>
@@ -263,7 +264,7 @@
           <a:p>
             <a:fld id="{E30499D9-1BFC-0241-B783-EF1B60557E44}" type="datetimeFigureOut">
               <a:rPr lang="en-GB" smtClean="0"/>
-              <a:t>17/11/2021</a:t>
+              <a:t>19/11/2021</a:t>
             </a:fld>
             <a:endParaRPr lang="en-GB"/>
           </a:p>
@@ -461,7 +462,7 @@
           <a:p>
             <a:fld id="{E30499D9-1BFC-0241-B783-EF1B60557E44}" type="datetimeFigureOut">
               <a:rPr lang="en-GB" smtClean="0"/>
-              <a:t>17/11/2021</a:t>
+              <a:t>19/11/2021</a:t>
             </a:fld>
             <a:endParaRPr lang="en-GB"/>
           </a:p>
@@ -669,7 +670,7 @@
           <a:p>
             <a:fld id="{E30499D9-1BFC-0241-B783-EF1B60557E44}" type="datetimeFigureOut">
               <a:rPr lang="en-GB" smtClean="0"/>
-              <a:t>17/11/2021</a:t>
+              <a:t>19/11/2021</a:t>
             </a:fld>
             <a:endParaRPr lang="en-GB"/>
           </a:p>
@@ -867,7 +868,7 @@
           <a:p>
             <a:fld id="{E30499D9-1BFC-0241-B783-EF1B60557E44}" type="datetimeFigureOut">
               <a:rPr lang="en-GB" smtClean="0"/>
-              <a:t>17/11/2021</a:t>
+              <a:t>19/11/2021</a:t>
             </a:fld>
             <a:endParaRPr lang="en-GB"/>
           </a:p>
@@ -1142,7 +1143,7 @@
           <a:p>
             <a:fld id="{E30499D9-1BFC-0241-B783-EF1B60557E44}" type="datetimeFigureOut">
               <a:rPr lang="en-GB" smtClean="0"/>
-              <a:t>17/11/2021</a:t>
+              <a:t>19/11/2021</a:t>
             </a:fld>
             <a:endParaRPr lang="en-GB"/>
           </a:p>
@@ -1407,7 +1408,7 @@
           <a:p>
             <a:fld id="{E30499D9-1BFC-0241-B783-EF1B60557E44}" type="datetimeFigureOut">
               <a:rPr lang="en-GB" smtClean="0"/>
-              <a:t>17/11/2021</a:t>
+              <a:t>19/11/2021</a:t>
             </a:fld>
             <a:endParaRPr lang="en-GB"/>
           </a:p>
@@ -1819,7 +1820,7 @@
           <a:p>
             <a:fld id="{E30499D9-1BFC-0241-B783-EF1B60557E44}" type="datetimeFigureOut">
               <a:rPr lang="en-GB" smtClean="0"/>
-              <a:t>17/11/2021</a:t>
+              <a:t>19/11/2021</a:t>
             </a:fld>
             <a:endParaRPr lang="en-GB"/>
           </a:p>
@@ -1960,7 +1961,7 @@
           <a:p>
             <a:fld id="{E30499D9-1BFC-0241-B783-EF1B60557E44}" type="datetimeFigureOut">
               <a:rPr lang="en-GB" smtClean="0"/>
-              <a:t>17/11/2021</a:t>
+              <a:t>19/11/2021</a:t>
             </a:fld>
             <a:endParaRPr lang="en-GB"/>
           </a:p>
@@ -2073,7 +2074,7 @@
           <a:p>
             <a:fld id="{E30499D9-1BFC-0241-B783-EF1B60557E44}" type="datetimeFigureOut">
               <a:rPr lang="en-GB" smtClean="0"/>
-              <a:t>17/11/2021</a:t>
+              <a:t>19/11/2021</a:t>
             </a:fld>
             <a:endParaRPr lang="en-GB"/>
           </a:p>
@@ -2384,7 +2385,7 @@
           <a:p>
             <a:fld id="{E30499D9-1BFC-0241-B783-EF1B60557E44}" type="datetimeFigureOut">
               <a:rPr lang="en-GB" smtClean="0"/>
-              <a:t>17/11/2021</a:t>
+              <a:t>19/11/2021</a:t>
             </a:fld>
             <a:endParaRPr lang="en-GB"/>
           </a:p>
@@ -2672,7 +2673,7 @@
           <a:p>
             <a:fld id="{E30499D9-1BFC-0241-B783-EF1B60557E44}" type="datetimeFigureOut">
               <a:rPr lang="en-GB" smtClean="0"/>
-              <a:t>17/11/2021</a:t>
+              <a:t>19/11/2021</a:t>
             </a:fld>
             <a:endParaRPr lang="en-GB"/>
           </a:p>
@@ -2913,7 +2914,7 @@
           <a:p>
             <a:fld id="{E30499D9-1BFC-0241-B783-EF1B60557E44}" type="datetimeFigureOut">
               <a:rPr lang="en-GB" smtClean="0"/>
-              <a:t>17/11/2021</a:t>
+              <a:t>19/11/2021</a:t>
             </a:fld>
             <a:endParaRPr lang="en-GB"/>
           </a:p>
@@ -3468,7 +3469,62 @@
           <a:bodyPr/>
           <a:lstStyle/>
           <a:p>
-            <a:endParaRPr lang="en-GB"/>
+            <a:r>
+              <a:rPr lang="en-GB" dirty="0"/>
+              <a:t>How to incorporate temporal images</a:t>
+            </a:r>
+          </a:p>
+          <a:p>
+            <a:pPr lvl="1"/>
+            <a:r>
+              <a:rPr lang="en-GB" dirty="0"/>
+              <a:t>Simply warping them again sufficient? </a:t>
+            </a:r>
+          </a:p>
+          <a:p>
+            <a:pPr marL="0" indent="0">
+              <a:buNone/>
+            </a:pPr>
+            <a:endParaRPr lang="en-GB" dirty="0"/>
+          </a:p>
+          <a:p>
+            <a:r>
+              <a:rPr lang="en-GB" dirty="0"/>
+              <a:t>What type of algorithm to use for anomaly detection</a:t>
+            </a:r>
+          </a:p>
+          <a:p>
+            <a:pPr lvl="1"/>
+            <a:r>
+              <a:rPr lang="en-GB" dirty="0" err="1"/>
+              <a:t>Pytorch</a:t>
+            </a:r>
+            <a:r>
+              <a:rPr lang="en-GB" dirty="0"/>
+              <a:t> from scratch or using pre-trained version from official JKU implementation (using other images)</a:t>
+            </a:r>
+          </a:p>
+          <a:p>
+            <a:pPr lvl="1"/>
+            <a:endParaRPr lang="en-GB" dirty="0"/>
+          </a:p>
+          <a:p>
+            <a:r>
+              <a:rPr lang="en-GB" dirty="0"/>
+              <a:t>Object detection what type of anomaly is it? </a:t>
+            </a:r>
+          </a:p>
+          <a:p>
+            <a:endParaRPr lang="en-GB" dirty="0"/>
+          </a:p>
+          <a:p>
+            <a:endParaRPr lang="en-GB" dirty="0"/>
+          </a:p>
+          <a:p>
+            <a:endParaRPr lang="en-GB" dirty="0"/>
+          </a:p>
+          <a:p>
+            <a:endParaRPr lang="en-GB" dirty="0"/>
           </a:p>
         </p:txBody>
       </p:sp>
@@ -3793,7 +3849,67 @@
             </a:r>
           </a:p>
           <a:p>
+            <a:pPr lvl="1"/>
+            <a:r>
+              <a:rPr lang="en-GB" sz="1400" dirty="0">
+                <a:hlinkClick r:id="rId3"/>
+              </a:rPr>
+              <a:t>https://github.com/JKU-ICG/AOS</a:t>
+            </a:r>
+            <a:r>
+              <a:rPr lang="en-GB" sz="1400" dirty="0"/>
+              <a:t> </a:t>
+            </a:r>
+          </a:p>
+          <a:p>
             <a:endParaRPr lang="en-GB" sz="1800" dirty="0"/>
+          </a:p>
+          <a:p>
+            <a:r>
+              <a:rPr lang="en-GB" dirty="0"/>
+              <a:t>Through-Foliage Tracking with Airborne Optical Sectioning </a:t>
+            </a:r>
+            <a:r>
+              <a:rPr lang="en-GB" sz="1800" dirty="0"/>
+              <a:t>- </a:t>
+            </a:r>
+            <a:r>
+              <a:rPr lang="en-GB" sz="1800" dirty="0">
+                <a:hlinkClick r:id="rId4"/>
+              </a:rPr>
+              <a:t>https://arxiv.org/abs/2111.06959</a:t>
+            </a:r>
+            <a:r>
+              <a:rPr lang="en-GB" sz="1800" dirty="0"/>
+              <a:t> </a:t>
+            </a:r>
+          </a:p>
+          <a:p>
+            <a:pPr lvl="1"/>
+            <a:r>
+              <a:rPr lang="en-GB" sz="1400" dirty="0"/>
+              <a:t>While detecting and tracking moving targets through foliage is difficult (and for many cases even impossible) in regular aerial images or videos, it becomes practically feasible with image integration – which is the core principle of Airborne Optical Sectioning. We have already shown that classification significantly benefits from image integration (</a:t>
+            </a:r>
+            <a:r>
+              <a:rPr lang="en-GB" sz="1400" dirty="0" err="1"/>
+              <a:t>Schedl</a:t>
+            </a:r>
+            <a:r>
+              <a:rPr lang="en-GB" sz="1400" dirty="0"/>
+              <a:t> et al. (2020b)). In this work we demonstrate that the same holds true for </a:t>
+            </a:r>
+            <a:r>
+              <a:rPr lang="en-GB" sz="1400" dirty="0" err="1"/>
+              <a:t>color</a:t>
+            </a:r>
+            <a:r>
+              <a:rPr lang="en-GB" sz="1400" dirty="0"/>
+              <a:t> anomaly detection. </a:t>
+            </a:r>
+          </a:p>
+          <a:p>
+            <a:pPr lvl="1"/>
+            <a:endParaRPr lang="en-GB" sz="1400" dirty="0"/>
           </a:p>
           <a:p>
             <a:pPr lvl="1"/>
@@ -3819,6 +3935,608 @@
 </file>
 
 <file path=ppt/slides/slide5.xml><?xml version="1.0" encoding="utf-8"?>
+<p:sld xmlns:a="http://schemas.openxmlformats.org/drawingml/2006/main" xmlns:r="http://schemas.openxmlformats.org/officeDocument/2006/relationships" xmlns:p="http://schemas.openxmlformats.org/presentationml/2006/main">
+  <p:cSld>
+    <p:spTree>
+      <p:nvGrpSpPr>
+        <p:cNvPr id="1" name=""/>
+        <p:cNvGrpSpPr/>
+        <p:nvPr/>
+      </p:nvGrpSpPr>
+      <p:grpSpPr>
+        <a:xfrm>
+          <a:off x="0" y="0"/>
+          <a:ext cx="0" cy="0"/>
+          <a:chOff x="0" y="0"/>
+          <a:chExt cx="0" cy="0"/>
+        </a:xfrm>
+      </p:grpSpPr>
+      <p:sp>
+        <p:nvSpPr>
+          <p:cNvPr id="2" name="Title 1">
+            <a:extLst>
+              <a:ext uri="{FF2B5EF4-FFF2-40B4-BE49-F238E27FC236}">
+                <a16:creationId xmlns:a16="http://schemas.microsoft.com/office/drawing/2014/main" id="{A0DD301A-450D-594E-96E3-EB9F39E7691F}"/>
+              </a:ext>
+            </a:extLst>
+          </p:cNvPr>
+          <p:cNvSpPr>
+            <a:spLocks noGrp="1"/>
+          </p:cNvSpPr>
+          <p:nvPr>
+            <p:ph type="title"/>
+          </p:nvPr>
+        </p:nvSpPr>
+        <p:spPr/>
+        <p:txBody>
+          <a:bodyPr/>
+          <a:lstStyle/>
+          <a:p>
+            <a:r>
+              <a:rPr lang="en-GB" dirty="0"/>
+              <a:t>Overview scientific papers</a:t>
+            </a:r>
+          </a:p>
+        </p:txBody>
+      </p:sp>
+      <p:sp>
+        <p:nvSpPr>
+          <p:cNvPr id="3" name="Content Placeholder 2">
+            <a:extLst>
+              <a:ext uri="{FF2B5EF4-FFF2-40B4-BE49-F238E27FC236}">
+                <a16:creationId xmlns:a16="http://schemas.microsoft.com/office/drawing/2014/main" id="{049DD2FC-FAFA-C94C-A960-34A207F06461}"/>
+              </a:ext>
+            </a:extLst>
+          </p:cNvPr>
+          <p:cNvSpPr>
+            <a:spLocks noGrp="1"/>
+          </p:cNvSpPr>
+          <p:nvPr>
+            <p:ph idx="1"/>
+          </p:nvPr>
+        </p:nvSpPr>
+        <p:spPr/>
+        <p:txBody>
+          <a:bodyPr>
+            <a:normAutofit/>
+          </a:bodyPr>
+          <a:lstStyle/>
+          <a:p>
+            <a:pPr marL="0" lvl="0" indent="0" eaLnBrk="0" fontAlgn="base" hangingPunct="0">
+              <a:lnSpc>
+                <a:spcPct val="100000"/>
+              </a:lnSpc>
+              <a:spcBef>
+                <a:spcPct val="0"/>
+              </a:spcBef>
+              <a:spcAft>
+                <a:spcPct val="0"/>
+              </a:spcAft>
+              <a:buFontTx/>
+              <a:buChar char="•"/>
+            </a:pPr>
+            <a:r>
+              <a:rPr lang="en-AT" altLang="en-AT" sz="1200" dirty="0">
+                <a:latin typeface="-apple-system"/>
+              </a:rPr>
+              <a:t>Rakesh John Amala Arokia Nathan, Indrajit Kurmi, David C. Schedl and Oliver Bimber, Through-Foliage Tracking with Airborne Optical Sectioning, Remote Sensing of Environment (under Review), (2021), </a:t>
+            </a:r>
+            <a:r>
+              <a:rPr lang="en-GB" sz="1200" dirty="0">
+                <a:hlinkClick r:id="rId2">
+                  <a:extLst>
+                    <a:ext uri="{A12FA001-AC4F-418D-AE19-62706E023703}">
+                      <ahyp:hlinkClr xmlns:ahyp="http://schemas.microsoft.com/office/drawing/2018/hyperlinkcolor" val="tx"/>
+                    </a:ext>
+                  </a:extLst>
+                </a:hlinkClick>
+              </a:rPr>
+              <a:t>https://arxiv.org/abs/2111.06959</a:t>
+            </a:r>
+            <a:r>
+              <a:rPr lang="en-GB" sz="1200" dirty="0"/>
+              <a:t> </a:t>
+            </a:r>
+          </a:p>
+          <a:p>
+            <a:pPr marL="0" lvl="0" indent="0" eaLnBrk="0" fontAlgn="base" hangingPunct="0">
+              <a:lnSpc>
+                <a:spcPct val="100000"/>
+              </a:lnSpc>
+              <a:spcBef>
+                <a:spcPct val="0"/>
+              </a:spcBef>
+              <a:spcAft>
+                <a:spcPct val="0"/>
+              </a:spcAft>
+              <a:buFontTx/>
+              <a:buChar char="•"/>
+            </a:pPr>
+            <a:r>
+              <a:rPr lang="en-GB" altLang="en-AT" sz="1200" dirty="0">
+                <a:latin typeface="-apple-system"/>
+              </a:rPr>
+              <a:t> </a:t>
+            </a:r>
+            <a:r>
+              <a:rPr lang="en-AT" altLang="en-AT" sz="1200" dirty="0">
+                <a:latin typeface="-apple-system"/>
+              </a:rPr>
+              <a:t>Indrajit Kurmi, David C. Schedl, and Oliver Bimber, Combined People Classification with Airborne Optical Sectioning, Nature Scientific Reports (under review), (2021),</a:t>
+            </a:r>
+            <a:r>
+              <a:rPr lang="en-GB" altLang="en-AT" sz="1200" dirty="0">
+                <a:latin typeface="-apple-system"/>
+              </a:rPr>
+              <a:t> </a:t>
+            </a:r>
+            <a:r>
+              <a:rPr lang="en-GB" altLang="en-AT" sz="1200" dirty="0">
+                <a:latin typeface="-apple-system"/>
+                <a:hlinkClick r:id="rId3">
+                  <a:extLst>
+                    <a:ext uri="{A12FA001-AC4F-418D-AE19-62706E023703}">
+                      <ahyp:hlinkClr xmlns:ahyp="http://schemas.microsoft.com/office/drawing/2018/hyperlinkcolor" val="tx"/>
+                    </a:ext>
+                  </a:extLst>
+                </a:hlinkClick>
+              </a:rPr>
+              <a:t>https://arxiv.org/abs/2106.10077</a:t>
+            </a:r>
+            <a:r>
+              <a:rPr lang="en-GB" altLang="en-AT" sz="1200" dirty="0">
+                <a:latin typeface="-apple-system"/>
+              </a:rPr>
+              <a:t> </a:t>
+            </a:r>
+            <a:endParaRPr lang="en-AT" altLang="en-AT" sz="1200" dirty="0">
+              <a:latin typeface="-apple-system"/>
+            </a:endParaRPr>
+          </a:p>
+          <a:p>
+            <a:pPr marL="0" lvl="0" indent="0" eaLnBrk="0" fontAlgn="base" hangingPunct="0">
+              <a:lnSpc>
+                <a:spcPct val="100000"/>
+              </a:lnSpc>
+              <a:spcBef>
+                <a:spcPct val="0"/>
+              </a:spcBef>
+              <a:spcAft>
+                <a:spcPct val="0"/>
+              </a:spcAft>
+              <a:buFontTx/>
+              <a:buChar char="•"/>
+            </a:pPr>
+            <a:r>
+              <a:rPr lang="en-AT" altLang="en-AT" sz="1200" dirty="0">
+                <a:latin typeface="-apple-system"/>
+              </a:rPr>
+              <a:t>David C. Schedl, Indrajit Kurmi, and Oliver Bimber, Autonomous Drones for Search and Rescue in Forests, Science Robotics 6(55), eabg1188, </a:t>
+            </a:r>
+            <a:r>
+              <a:rPr lang="en-AT" altLang="en-AT" sz="1200" dirty="0">
+                <a:latin typeface="-apple-system"/>
+                <a:hlinkClick r:id="rId4">
+                  <a:extLst>
+                    <a:ext uri="{A12FA001-AC4F-418D-AE19-62706E023703}">
+                      <ahyp:hlinkClr xmlns:ahyp="http://schemas.microsoft.com/office/drawing/2018/hyperlinkcolor" val="tx"/>
+                    </a:ext>
+                  </a:extLst>
+                </a:hlinkClick>
+              </a:rPr>
+              <a:t>https://doi.org/10.1126/scirobotics.abg1188</a:t>
+            </a:r>
+            <a:r>
+              <a:rPr lang="en-AT" altLang="en-AT" sz="1200" dirty="0">
+                <a:latin typeface="-apple-system"/>
+              </a:rPr>
+              <a:t>, (2021)</a:t>
+            </a:r>
+          </a:p>
+          <a:p>
+            <a:pPr marL="0" lvl="0" indent="0" eaLnBrk="0" fontAlgn="base" hangingPunct="0">
+              <a:lnSpc>
+                <a:spcPct val="100000"/>
+              </a:lnSpc>
+              <a:spcBef>
+                <a:spcPct val="0"/>
+              </a:spcBef>
+              <a:spcAft>
+                <a:spcPct val="0"/>
+              </a:spcAft>
+              <a:buFontTx/>
+              <a:buChar char="•"/>
+            </a:pPr>
+            <a:r>
+              <a:rPr lang="en-AT" altLang="en-AT" sz="1200" dirty="0">
+                <a:latin typeface="-apple-system"/>
+              </a:rPr>
+              <a:t>David C. Schedl, Indrajit Kurmi, and Oliver Bimber, Search and rescue with airborne optical sectioning, Nature Machine Intelligence 2, 783-790, </a:t>
+            </a:r>
+            <a:r>
+              <a:rPr lang="en-AT" altLang="en-AT" sz="1200" dirty="0">
+                <a:latin typeface="-apple-system"/>
+                <a:hlinkClick r:id="rId5">
+                  <a:extLst>
+                    <a:ext uri="{A12FA001-AC4F-418D-AE19-62706E023703}">
+                      <ahyp:hlinkClr xmlns:ahyp="http://schemas.microsoft.com/office/drawing/2018/hyperlinkcolor" val="tx"/>
+                    </a:ext>
+                  </a:extLst>
+                </a:hlinkClick>
+              </a:rPr>
+              <a:t>https://doi.org/10.1038/s42256-020-00261-3</a:t>
+            </a:r>
+            <a:r>
+              <a:rPr lang="en-AT" altLang="en-AT" sz="1200" dirty="0">
+                <a:latin typeface="-apple-system"/>
+              </a:rPr>
+              <a:t> (2020)</a:t>
+            </a:r>
+          </a:p>
+          <a:p>
+            <a:pPr marL="0" lvl="0" indent="0" eaLnBrk="0" fontAlgn="base" hangingPunct="0">
+              <a:lnSpc>
+                <a:spcPct val="100000"/>
+              </a:lnSpc>
+              <a:spcBef>
+                <a:spcPct val="0"/>
+              </a:spcBef>
+              <a:spcAft>
+                <a:spcPct val="0"/>
+              </a:spcAft>
+              <a:buFontTx/>
+              <a:buChar char="•"/>
+            </a:pPr>
+            <a:r>
+              <a:rPr lang="en-AT" altLang="en-AT" sz="1200" dirty="0">
+                <a:latin typeface="-apple-system"/>
+              </a:rPr>
+              <a:t>Indrajit Kurmi, David C. Schedl, and Oliver Bimber, Pose Error Reduction for Focus Enhancement in Thermal Synthetic Aperture Visualization, IEEE Geoscience and Remote Sensing Letters, DOI: </a:t>
+            </a:r>
+            <a:r>
+              <a:rPr lang="en-AT" altLang="en-AT" sz="1200" dirty="0">
+                <a:latin typeface="-apple-system"/>
+                <a:hlinkClick r:id="rId6">
+                  <a:extLst>
+                    <a:ext uri="{A12FA001-AC4F-418D-AE19-62706E023703}">
+                      <ahyp:hlinkClr xmlns:ahyp="http://schemas.microsoft.com/office/drawing/2018/hyperlinkcolor" val="tx"/>
+                    </a:ext>
+                  </a:extLst>
+                </a:hlinkClick>
+              </a:rPr>
+              <a:t>https://doi.org/10.1109/LGRS.2021.3051718</a:t>
+            </a:r>
+            <a:r>
+              <a:rPr lang="en-AT" altLang="en-AT" sz="1200" dirty="0">
+                <a:latin typeface="-apple-system"/>
+              </a:rPr>
+              <a:t> (2021).</a:t>
+            </a:r>
+          </a:p>
+          <a:p>
+            <a:pPr marL="0" lvl="0" indent="0" eaLnBrk="0" fontAlgn="base" hangingPunct="0">
+              <a:lnSpc>
+                <a:spcPct val="100000"/>
+              </a:lnSpc>
+              <a:spcBef>
+                <a:spcPct val="0"/>
+              </a:spcBef>
+              <a:spcAft>
+                <a:spcPct val="0"/>
+              </a:spcAft>
+              <a:buFontTx/>
+              <a:buChar char="•"/>
+            </a:pPr>
+            <a:r>
+              <a:rPr lang="en-AT" altLang="en-AT" sz="1200" dirty="0">
+                <a:latin typeface="-apple-system"/>
+              </a:rPr>
+              <a:t>Indrajit Kurmi, David C. Schedl, and Oliver Bimber, Fast automatic visibility optimization for thermal synthetic aperture visualization, IEEE Geosci. Remote Sens. Lett. </a:t>
+            </a:r>
+            <a:r>
+              <a:rPr lang="en-AT" altLang="en-AT" sz="1200" dirty="0">
+                <a:latin typeface="-apple-system"/>
+                <a:hlinkClick r:id="rId7">
+                  <a:extLst>
+                    <a:ext uri="{A12FA001-AC4F-418D-AE19-62706E023703}">
+                      <ahyp:hlinkClr xmlns:ahyp="http://schemas.microsoft.com/office/drawing/2018/hyperlinkcolor" val="tx"/>
+                    </a:ext>
+                  </a:extLst>
+                </a:hlinkClick>
+              </a:rPr>
+              <a:t>https://doi.org/10.1109/LGRS.2020.2987471</a:t>
+            </a:r>
+            <a:r>
+              <a:rPr lang="en-AT" altLang="en-AT" sz="1200" dirty="0">
+                <a:latin typeface="-apple-system"/>
+              </a:rPr>
+              <a:t> (2020).</a:t>
+            </a:r>
+          </a:p>
+          <a:p>
+            <a:pPr marL="0" lvl="0" indent="0" eaLnBrk="0" fontAlgn="base" hangingPunct="0">
+              <a:lnSpc>
+                <a:spcPct val="100000"/>
+              </a:lnSpc>
+              <a:spcBef>
+                <a:spcPct val="0"/>
+              </a:spcBef>
+              <a:spcAft>
+                <a:spcPct val="0"/>
+              </a:spcAft>
+              <a:buFontTx/>
+              <a:buChar char="•"/>
+            </a:pPr>
+            <a:r>
+              <a:rPr lang="en-AT" altLang="en-AT" sz="1200" dirty="0">
+                <a:latin typeface="-apple-system"/>
+              </a:rPr>
+              <a:t>David C. Schedl, Indrajit Kurmi, and Oliver Bimber, Airborne Optical Sectioning for Nesting Observation. Sci Rep 10, 7254, </a:t>
+            </a:r>
+            <a:r>
+              <a:rPr lang="en-AT" altLang="en-AT" sz="1200" dirty="0">
+                <a:latin typeface="-apple-system"/>
+                <a:hlinkClick r:id="rId8">
+                  <a:extLst>
+                    <a:ext uri="{A12FA001-AC4F-418D-AE19-62706E023703}">
+                      <ahyp:hlinkClr xmlns:ahyp="http://schemas.microsoft.com/office/drawing/2018/hyperlinkcolor" val="tx"/>
+                    </a:ext>
+                  </a:extLst>
+                </a:hlinkClick>
+              </a:rPr>
+              <a:t>https://doi.org/10.1038/s41598-020-63317-9</a:t>
+            </a:r>
+            <a:r>
+              <a:rPr lang="en-AT" altLang="en-AT" sz="1200" dirty="0">
+                <a:latin typeface="-apple-system"/>
+              </a:rPr>
+              <a:t> (2020).</a:t>
+            </a:r>
+          </a:p>
+          <a:p>
+            <a:pPr marL="0" lvl="0" indent="0" eaLnBrk="0" fontAlgn="base" hangingPunct="0">
+              <a:lnSpc>
+                <a:spcPct val="100000"/>
+              </a:lnSpc>
+              <a:spcBef>
+                <a:spcPct val="0"/>
+              </a:spcBef>
+              <a:spcAft>
+                <a:spcPct val="0"/>
+              </a:spcAft>
+              <a:buFontTx/>
+              <a:buChar char="•"/>
+            </a:pPr>
+            <a:r>
+              <a:rPr lang="en-AT" altLang="en-AT" sz="1200" dirty="0">
+                <a:latin typeface="-apple-system"/>
+              </a:rPr>
+              <a:t>Indrajit Kurmi, David C. Schedl, and Oliver Bimber, Thermal airborne optical sectioning. Remote Sensing. 11, 1668, </a:t>
+            </a:r>
+            <a:r>
+              <a:rPr lang="en-AT" altLang="en-AT" sz="1200" dirty="0">
+                <a:latin typeface="-apple-system"/>
+                <a:hlinkClick r:id="rId9">
+                  <a:extLst>
+                    <a:ext uri="{A12FA001-AC4F-418D-AE19-62706E023703}">
+                      <ahyp:hlinkClr xmlns:ahyp="http://schemas.microsoft.com/office/drawing/2018/hyperlinkcolor" val="tx"/>
+                    </a:ext>
+                  </a:extLst>
+                </a:hlinkClick>
+              </a:rPr>
+              <a:t>https://doi.org/10.3390/rs11141668</a:t>
+            </a:r>
+            <a:r>
+              <a:rPr lang="en-AT" altLang="en-AT" sz="1200" dirty="0">
+                <a:latin typeface="-apple-system"/>
+              </a:rPr>
+              <a:t>, (2019).</a:t>
+            </a:r>
+          </a:p>
+          <a:p>
+            <a:pPr lvl="1"/>
+            <a:endParaRPr lang="en-GB" sz="1400" dirty="0"/>
+          </a:p>
+        </p:txBody>
+      </p:sp>
+      <p:sp>
+        <p:nvSpPr>
+          <p:cNvPr id="10" name="AutoShape 7" descr="DOI">
+            <a:hlinkClick r:id="rId10"/>
+            <a:extLst>
+              <a:ext uri="{FF2B5EF4-FFF2-40B4-BE49-F238E27FC236}">
+                <a16:creationId xmlns:a16="http://schemas.microsoft.com/office/drawing/2014/main" id="{55E6C380-2A9A-0C40-B963-0E57BB24D1D0}"/>
+              </a:ext>
+            </a:extLst>
+          </p:cNvPr>
+          <p:cNvSpPr>
+            <a:spLocks noChangeAspect="1" noChangeArrowheads="1"/>
+          </p:cNvSpPr>
+          <p:nvPr/>
+        </p:nvSpPr>
+        <p:spPr bwMode="auto">
+          <a:xfrm>
+            <a:off x="969963" y="-2498725"/>
+            <a:ext cx="304800" cy="304800"/>
+          </a:xfrm>
+          <a:prstGeom prst="rect">
+            <a:avLst/>
+          </a:prstGeom>
+          <a:noFill/>
+          <a:extLst>
+            <a:ext uri="{909E8E84-426E-40DD-AFC4-6F175D3DCCD1}">
+              <a14:hiddenFill xmlns:a14="http://schemas.microsoft.com/office/drawing/2010/main">
+                <a:solidFill>
+                  <a:srgbClr val="FFFFFF"/>
+                </a:solidFill>
+              </a14:hiddenFill>
+            </a:ext>
+          </a:extLst>
+        </p:spPr>
+        <p:txBody>
+          <a:bodyPr vert="horz" wrap="square" lIns="91440" tIns="45720" rIns="91440" bIns="45720" numCol="1" anchor="t" anchorCtr="0" compatLnSpc="1">
+            <a:prstTxWarp prst="textNoShape">
+              <a:avLst/>
+            </a:prstTxWarp>
+          </a:bodyPr>
+          <a:lstStyle/>
+          <a:p>
+            <a:endParaRPr lang="en-GB"/>
+          </a:p>
+        </p:txBody>
+      </p:sp>
+      <p:sp>
+        <p:nvSpPr>
+          <p:cNvPr id="11" name="AutoShape 8" descr="DOI">
+            <a:hlinkClick r:id="rId11"/>
+            <a:extLst>
+              <a:ext uri="{FF2B5EF4-FFF2-40B4-BE49-F238E27FC236}">
+                <a16:creationId xmlns:a16="http://schemas.microsoft.com/office/drawing/2014/main" id="{FC3CA384-9A84-0643-8FF4-3A6BCE04A63B}"/>
+              </a:ext>
+            </a:extLst>
+          </p:cNvPr>
+          <p:cNvSpPr>
+            <a:spLocks noChangeAspect="1" noChangeArrowheads="1"/>
+          </p:cNvSpPr>
+          <p:nvPr/>
+        </p:nvSpPr>
+        <p:spPr bwMode="auto">
+          <a:xfrm>
+            <a:off x="969963" y="-1477963"/>
+            <a:ext cx="304800" cy="304800"/>
+          </a:xfrm>
+          <a:prstGeom prst="rect">
+            <a:avLst/>
+          </a:prstGeom>
+          <a:noFill/>
+          <a:extLst>
+            <a:ext uri="{909E8E84-426E-40DD-AFC4-6F175D3DCCD1}">
+              <a14:hiddenFill xmlns:a14="http://schemas.microsoft.com/office/drawing/2010/main">
+                <a:solidFill>
+                  <a:srgbClr val="FFFFFF"/>
+                </a:solidFill>
+              </a14:hiddenFill>
+            </a:ext>
+          </a:extLst>
+        </p:spPr>
+        <p:txBody>
+          <a:bodyPr vert="horz" wrap="square" lIns="91440" tIns="45720" rIns="91440" bIns="45720" numCol="1" anchor="t" anchorCtr="0" compatLnSpc="1">
+            <a:prstTxWarp prst="textNoShape">
+              <a:avLst/>
+            </a:prstTxWarp>
+          </a:bodyPr>
+          <a:lstStyle/>
+          <a:p>
+            <a:endParaRPr lang="en-GB"/>
+          </a:p>
+        </p:txBody>
+      </p:sp>
+      <p:sp>
+        <p:nvSpPr>
+          <p:cNvPr id="12" name="AutoShape 9" descr="DOI">
+            <a:hlinkClick r:id="rId12"/>
+            <a:extLst>
+              <a:ext uri="{FF2B5EF4-FFF2-40B4-BE49-F238E27FC236}">
+                <a16:creationId xmlns:a16="http://schemas.microsoft.com/office/drawing/2014/main" id="{C3B7690D-ED36-9C4B-961A-0FA1666B3A24}"/>
+              </a:ext>
+            </a:extLst>
+          </p:cNvPr>
+          <p:cNvSpPr>
+            <a:spLocks noChangeAspect="1" noChangeArrowheads="1"/>
+          </p:cNvSpPr>
+          <p:nvPr/>
+        </p:nvSpPr>
+        <p:spPr bwMode="auto">
+          <a:xfrm>
+            <a:off x="969963" y="-639763"/>
+            <a:ext cx="304800" cy="304800"/>
+          </a:xfrm>
+          <a:prstGeom prst="rect">
+            <a:avLst/>
+          </a:prstGeom>
+          <a:noFill/>
+          <a:extLst>
+            <a:ext uri="{909E8E84-426E-40DD-AFC4-6F175D3DCCD1}">
+              <a14:hiddenFill xmlns:a14="http://schemas.microsoft.com/office/drawing/2010/main">
+                <a:solidFill>
+                  <a:srgbClr val="FFFFFF"/>
+                </a:solidFill>
+              </a14:hiddenFill>
+            </a:ext>
+          </a:extLst>
+        </p:spPr>
+        <p:txBody>
+          <a:bodyPr vert="horz" wrap="square" lIns="91440" tIns="45720" rIns="91440" bIns="45720" numCol="1" anchor="t" anchorCtr="0" compatLnSpc="1">
+            <a:prstTxWarp prst="textNoShape">
+              <a:avLst/>
+            </a:prstTxWarp>
+          </a:bodyPr>
+          <a:lstStyle/>
+          <a:p>
+            <a:endParaRPr lang="en-GB"/>
+          </a:p>
+        </p:txBody>
+      </p:sp>
+      <p:sp>
+        <p:nvSpPr>
+          <p:cNvPr id="13" name="AutoShape 10" descr="DOI">
+            <a:hlinkClick r:id="rId13"/>
+            <a:extLst>
+              <a:ext uri="{FF2B5EF4-FFF2-40B4-BE49-F238E27FC236}">
+                <a16:creationId xmlns:a16="http://schemas.microsoft.com/office/drawing/2014/main" id="{5D190095-8636-484D-8D7F-127547216529}"/>
+              </a:ext>
+            </a:extLst>
+          </p:cNvPr>
+          <p:cNvSpPr>
+            <a:spLocks noChangeAspect="1" noChangeArrowheads="1"/>
+          </p:cNvSpPr>
+          <p:nvPr/>
+        </p:nvSpPr>
+        <p:spPr bwMode="auto">
+          <a:xfrm>
+            <a:off x="969963" y="381000"/>
+            <a:ext cx="304800" cy="304800"/>
+          </a:xfrm>
+          <a:prstGeom prst="rect">
+            <a:avLst/>
+          </a:prstGeom>
+          <a:noFill/>
+          <a:extLst>
+            <a:ext uri="{909E8E84-426E-40DD-AFC4-6F175D3DCCD1}">
+              <a14:hiddenFill xmlns:a14="http://schemas.microsoft.com/office/drawing/2010/main">
+                <a:solidFill>
+                  <a:srgbClr val="FFFFFF"/>
+                </a:solidFill>
+              </a14:hiddenFill>
+            </a:ext>
+          </a:extLst>
+        </p:spPr>
+        <p:txBody>
+          <a:bodyPr vert="horz" wrap="square" lIns="91440" tIns="45720" rIns="91440" bIns="45720" numCol="1" anchor="t" anchorCtr="0" compatLnSpc="1">
+            <a:prstTxWarp prst="textNoShape">
+              <a:avLst/>
+            </a:prstTxWarp>
+          </a:bodyPr>
+          <a:lstStyle/>
+          <a:p>
+            <a:endParaRPr lang="en-GB"/>
+          </a:p>
+        </p:txBody>
+      </p:sp>
+    </p:spTree>
+    <p:extLst>
+      <p:ext uri="{BB962C8B-B14F-4D97-AF65-F5344CB8AC3E}">
+        <p14:creationId xmlns:p14="http://schemas.microsoft.com/office/powerpoint/2010/main" val="541507533"/>
+      </p:ext>
+    </p:extLst>
+  </p:cSld>
+  <p:clrMapOvr>
+    <a:masterClrMapping/>
+  </p:clrMapOvr>
+</p:sld>
+</file>
+
+<file path=ppt/slides/slide6.xml><?xml version="1.0" encoding="utf-8"?>
 <p:sld xmlns:a="http://schemas.openxmlformats.org/drawingml/2006/main" xmlns:r="http://schemas.openxmlformats.org/officeDocument/2006/relationships" xmlns:p="http://schemas.openxmlformats.org/presentationml/2006/main">
   <p:cSld>
     <p:spTree>

</xml_diff>